<commit_message>
added VSCode C++ autocomplete
</commit_message>
<xml_diff>
--- a/FreeBSD-Drop/Desktop/FreeBSD.pptx
+++ b/FreeBSD-Drop/Desktop/FreeBSD.pptx
@@ -3275,7 +3275,7 @@
         <p:spPr>
           <a:xfrm>
             <a:off x="504000" y="226080"/>
-            <a:ext cx="9070200" cy="945000"/>
+            <a:ext cx="9069840" cy="944640"/>
           </a:xfrm>
           <a:prstGeom prst="rect">
             <a:avLst/>
@@ -3326,7 +3326,7 @@
         <p:spPr>
           <a:xfrm>
             <a:off x="504000" y="1326600"/>
-            <a:ext cx="9070200" cy="3286800"/>
+            <a:ext cx="9069840" cy="3286440"/>
           </a:xfrm>
           <a:prstGeom prst="rect">
             <a:avLst/>
@@ -3454,7 +3454,7 @@
         <p:spPr>
           <a:xfrm>
             <a:off x="504000" y="226080"/>
-            <a:ext cx="9070200" cy="945000"/>
+            <a:ext cx="9069840" cy="944640"/>
           </a:xfrm>
           <a:prstGeom prst="rect">
             <a:avLst/>
@@ -3505,7 +3505,7 @@
         <p:spPr>
           <a:xfrm>
             <a:off x="504000" y="1326600"/>
-            <a:ext cx="9070200" cy="3286800"/>
+            <a:ext cx="9069840" cy="3286440"/>
           </a:xfrm>
           <a:prstGeom prst="rect">
             <a:avLst/>
@@ -3526,7 +3526,7 @@
             <a:normAutofit fontScale="57000"/>
           </a:bodyPr>
           <a:p>
-            <a:pPr marL="432000" indent="-322560">
+            <a:pPr marL="432000" indent="-322200">
               <a:lnSpc>
                 <a:spcPct val="100000"/>
               </a:lnSpc>
@@ -3556,7 +3556,7 @@
             </a:endParaRPr>
           </a:p>
           <a:p>
-            <a:pPr marL="432000" indent="-322560">
+            <a:pPr marL="432000" indent="-322200">
               <a:lnSpc>
                 <a:spcPct val="100000"/>
               </a:lnSpc>
@@ -3598,7 +3598,7 @@
             </a:endParaRPr>
           </a:p>
           <a:p>
-            <a:pPr marL="432000" indent="-322560">
+            <a:pPr marL="432000" indent="-322200">
               <a:lnSpc>
                 <a:spcPct val="100000"/>
               </a:lnSpc>
@@ -3627,7 +3627,7 @@
             </a:endParaRPr>
           </a:p>
           <a:p>
-            <a:pPr marL="432000" indent="-322560">
+            <a:pPr marL="432000" indent="-322200">
               <a:lnSpc>
                 <a:spcPct val="100000"/>
               </a:lnSpc>
@@ -3656,7 +3656,7 @@
             </a:endParaRPr>
           </a:p>
           <a:p>
-            <a:pPr lvl="1" marL="864000" indent="-322560">
+            <a:pPr lvl="1" marL="864000" indent="-322200">
               <a:lnSpc>
                 <a:spcPct val="100000"/>
               </a:lnSpc>
@@ -3695,7 +3695,7 @@
             </a:endParaRPr>
           </a:p>
           <a:p>
-            <a:pPr marL="432000" indent="-322560">
+            <a:pPr marL="432000" indent="-322200">
               <a:lnSpc>
                 <a:spcPct val="100000"/>
               </a:lnSpc>
@@ -3724,7 +3724,7 @@
             </a:endParaRPr>
           </a:p>
           <a:p>
-            <a:pPr lvl="1" marL="864000" indent="-322560">
+            <a:pPr lvl="1" marL="864000" indent="-322200">
               <a:lnSpc>
                 <a:spcPct val="100000"/>
               </a:lnSpc>
@@ -3813,7 +3813,7 @@
         <p:spPr>
           <a:xfrm>
             <a:off x="504000" y="226080"/>
-            <a:ext cx="9070200" cy="945000"/>
+            <a:ext cx="9069840" cy="944640"/>
           </a:xfrm>
           <a:prstGeom prst="rect">
             <a:avLst/>
@@ -3874,7 +3874,7 @@
         <p:spPr>
           <a:xfrm>
             <a:off x="1600200" y="1143000"/>
-            <a:ext cx="7771320" cy="4113720"/>
+            <a:ext cx="7770960" cy="4113360"/>
           </a:xfrm>
           <a:prstGeom prst="rect">
             <a:avLst/>
@@ -4021,7 +4021,7 @@
         <p:spPr>
           <a:xfrm>
             <a:off x="504000" y="226080"/>
-            <a:ext cx="9070200" cy="945000"/>
+            <a:ext cx="9069840" cy="944640"/>
           </a:xfrm>
           <a:prstGeom prst="rect">
             <a:avLst/>
@@ -4072,7 +4072,7 @@
         <p:spPr>
           <a:xfrm>
             <a:off x="504000" y="1326600"/>
-            <a:ext cx="9070200" cy="3286800"/>
+            <a:ext cx="9069840" cy="3286440"/>
           </a:xfrm>
           <a:prstGeom prst="rect">
             <a:avLst/>
@@ -4093,7 +4093,7 @@
             <a:normAutofit fontScale="70000"/>
           </a:bodyPr>
           <a:p>
-            <a:pPr marL="432000" indent="-322560">
+            <a:pPr marL="432000" indent="-322200">
               <a:lnSpc>
                 <a:spcPct val="100000"/>
               </a:lnSpc>
@@ -4122,7 +4122,7 @@
             </a:endParaRPr>
           </a:p>
           <a:p>
-            <a:pPr marL="432000" indent="-322560">
+            <a:pPr marL="432000" indent="-322200">
               <a:lnSpc>
                 <a:spcPct val="100000"/>
               </a:lnSpc>
@@ -4151,7 +4151,7 @@
             </a:endParaRPr>
           </a:p>
           <a:p>
-            <a:pPr lvl="1" marL="864000" indent="-322560">
+            <a:pPr lvl="1" marL="864000" indent="-322200">
               <a:lnSpc>
                 <a:spcPct val="100000"/>
               </a:lnSpc>
@@ -4180,7 +4180,7 @@
             </a:endParaRPr>
           </a:p>
           <a:p>
-            <a:pPr lvl="1" marL="864000" indent="-322560">
+            <a:pPr lvl="1" marL="864000" indent="-322200">
               <a:lnSpc>
                 <a:spcPct val="100000"/>
               </a:lnSpc>
@@ -4209,7 +4209,7 @@
             </a:endParaRPr>
           </a:p>
           <a:p>
-            <a:pPr marL="432000" indent="-322560">
+            <a:pPr marL="432000" indent="-322200">
               <a:lnSpc>
                 <a:spcPct val="100000"/>
               </a:lnSpc>
@@ -4238,7 +4238,7 @@
             </a:endParaRPr>
           </a:p>
           <a:p>
-            <a:pPr lvl="1" marL="864000" indent="-322560">
+            <a:pPr lvl="1" marL="864000" indent="-322200">
               <a:lnSpc>
                 <a:spcPct val="100000"/>
               </a:lnSpc>
@@ -4314,7 +4314,7 @@
         <p:spPr>
           <a:xfrm>
             <a:off x="504000" y="226080"/>
-            <a:ext cx="9070200" cy="945000"/>
+            <a:ext cx="9069840" cy="944640"/>
           </a:xfrm>
           <a:prstGeom prst="rect">
             <a:avLst/>
@@ -4365,7 +4365,7 @@
         <p:spPr>
           <a:xfrm>
             <a:off x="504000" y="1326600"/>
-            <a:ext cx="9070200" cy="3286800"/>
+            <a:ext cx="9069840" cy="3286440"/>
           </a:xfrm>
           <a:prstGeom prst="rect">
             <a:avLst/>
@@ -4386,7 +4386,7 @@
             <a:normAutofit/>
           </a:bodyPr>
           <a:p>
-            <a:pPr marL="432000" indent="-322560">
+            <a:pPr marL="432000" indent="-322200">
               <a:lnSpc>
                 <a:spcPct val="100000"/>
               </a:lnSpc>
@@ -4415,7 +4415,7 @@
             </a:endParaRPr>
           </a:p>
           <a:p>
-            <a:pPr marL="432000" indent="-322560">
+            <a:pPr marL="432000" indent="-322200">
               <a:lnSpc>
                 <a:spcPct val="100000"/>
               </a:lnSpc>
@@ -4444,7 +4444,7 @@
             </a:endParaRPr>
           </a:p>
           <a:p>
-            <a:pPr marL="432000" indent="-322560">
+            <a:pPr marL="432000" indent="-322200">
               <a:lnSpc>
                 <a:spcPct val="100000"/>
               </a:lnSpc>
@@ -4473,7 +4473,7 @@
             </a:endParaRPr>
           </a:p>
           <a:p>
-            <a:pPr marL="432000" indent="-322560">
+            <a:pPr marL="432000" indent="-322200">
               <a:lnSpc>
                 <a:spcPct val="100000"/>
               </a:lnSpc>
@@ -4549,7 +4549,7 @@
         <p:spPr>
           <a:xfrm>
             <a:off x="504000" y="226080"/>
-            <a:ext cx="9070200" cy="945000"/>
+            <a:ext cx="9069840" cy="944640"/>
           </a:xfrm>
           <a:prstGeom prst="rect">
             <a:avLst/>
@@ -4600,7 +4600,7 @@
         <p:spPr>
           <a:xfrm>
             <a:off x="504000" y="1326600"/>
-            <a:ext cx="9070200" cy="3286800"/>
+            <a:ext cx="9069840" cy="3286440"/>
           </a:xfrm>
           <a:prstGeom prst="rect">
             <a:avLst/>
@@ -4621,7 +4621,7 @@
             <a:normAutofit fontScale="31000"/>
           </a:bodyPr>
           <a:p>
-            <a:pPr marL="432000" indent="-322560">
+            <a:pPr marL="432000" indent="-322200">
               <a:lnSpc>
                 <a:spcPct val="100000"/>
               </a:lnSpc>
@@ -4650,7 +4650,7 @@
             </a:endParaRPr>
           </a:p>
           <a:p>
-            <a:pPr marL="432000" indent="-322560">
+            <a:pPr marL="432000" indent="-322200">
               <a:lnSpc>
                 <a:spcPct val="100000"/>
               </a:lnSpc>
@@ -4679,7 +4679,7 @@
             </a:endParaRPr>
           </a:p>
           <a:p>
-            <a:pPr lvl="1" marL="864000" indent="-322560">
+            <a:pPr lvl="1" marL="864000" indent="-322200">
               <a:lnSpc>
                 <a:spcPct val="100000"/>
               </a:lnSpc>
@@ -4708,7 +4708,7 @@
             </a:endParaRPr>
           </a:p>
           <a:p>
-            <a:pPr lvl="1" marL="864000" indent="-322560">
+            <a:pPr lvl="1" marL="864000" indent="-322200">
               <a:lnSpc>
                 <a:spcPct val="100000"/>
               </a:lnSpc>
@@ -4767,7 +4767,7 @@
             </a:endParaRPr>
           </a:p>
           <a:p>
-            <a:pPr marL="432000" indent="-322560">
+            <a:pPr marL="432000" indent="-322200">
               <a:lnSpc>
                 <a:spcPct val="100000"/>
               </a:lnSpc>
@@ -4796,7 +4796,7 @@
             </a:endParaRPr>
           </a:p>
           <a:p>
-            <a:pPr lvl="1" marL="864000" indent="-322560">
+            <a:pPr lvl="1" marL="864000" indent="-322200">
               <a:lnSpc>
                 <a:spcPct val="100000"/>
               </a:lnSpc>
@@ -4825,7 +4825,7 @@
             </a:endParaRPr>
           </a:p>
           <a:p>
-            <a:pPr lvl="1" marL="864000" indent="-322560">
+            <a:pPr lvl="1" marL="864000" indent="-322200">
               <a:lnSpc>
                 <a:spcPct val="100000"/>
               </a:lnSpc>
@@ -4854,7 +4854,7 @@
             </a:endParaRPr>
           </a:p>
           <a:p>
-            <a:pPr lvl="1" marL="864000" indent="-322560">
+            <a:pPr lvl="1" marL="864000" indent="-322200">
               <a:lnSpc>
                 <a:spcPct val="100000"/>
               </a:lnSpc>
@@ -4883,7 +4883,7 @@
             </a:endParaRPr>
           </a:p>
           <a:p>
-            <a:pPr lvl="1" marL="864000" indent="-322560">
+            <a:pPr lvl="1" marL="864000" indent="-322200">
               <a:lnSpc>
                 <a:spcPct val="100000"/>
               </a:lnSpc>
@@ -4972,7 +4972,7 @@
         <p:spPr>
           <a:xfrm>
             <a:off x="504000" y="226080"/>
-            <a:ext cx="9070200" cy="945000"/>
+            <a:ext cx="9069840" cy="944640"/>
           </a:xfrm>
           <a:prstGeom prst="rect">
             <a:avLst/>
@@ -5023,7 +5023,7 @@
         <p:spPr>
           <a:xfrm>
             <a:off x="504000" y="1326600"/>
-            <a:ext cx="9070200" cy="3286800"/>
+            <a:ext cx="9069840" cy="3286440"/>
           </a:xfrm>
           <a:prstGeom prst="rect">
             <a:avLst/>
@@ -5044,7 +5044,7 @@
             <a:normAutofit fontScale="49000"/>
           </a:bodyPr>
           <a:p>
-            <a:pPr marL="432000" indent="-322560">
+            <a:pPr marL="432000" indent="-322200">
               <a:lnSpc>
                 <a:spcPct val="100000"/>
               </a:lnSpc>
@@ -5073,7 +5073,7 @@
             </a:endParaRPr>
           </a:p>
           <a:p>
-            <a:pPr lvl="1" marL="864000" indent="-322560">
+            <a:pPr lvl="1" marL="864000" indent="-322200">
               <a:lnSpc>
                 <a:spcPct val="100000"/>
               </a:lnSpc>
@@ -5102,7 +5102,7 @@
             </a:endParaRPr>
           </a:p>
           <a:p>
-            <a:pPr lvl="1" marL="864000" indent="-322560">
+            <a:pPr lvl="1" marL="864000" indent="-322200">
               <a:lnSpc>
                 <a:spcPct val="100000"/>
               </a:lnSpc>
@@ -5131,7 +5131,7 @@
             </a:endParaRPr>
           </a:p>
           <a:p>
-            <a:pPr lvl="1" marL="864000" indent="-322560">
+            <a:pPr lvl="1" marL="864000" indent="-322200">
               <a:lnSpc>
                 <a:spcPct val="100000"/>
               </a:lnSpc>
@@ -5160,7 +5160,7 @@
             </a:endParaRPr>
           </a:p>
           <a:p>
-            <a:pPr lvl="1" marL="864000" indent="-322560">
+            <a:pPr lvl="1" marL="864000" indent="-322200">
               <a:lnSpc>
                 <a:spcPct val="100000"/>
               </a:lnSpc>
@@ -5189,7 +5189,7 @@
             </a:endParaRPr>
           </a:p>
           <a:p>
-            <a:pPr lvl="2" marL="1296000" indent="-286560">
+            <a:pPr lvl="2" marL="1296000" indent="-286200">
               <a:lnSpc>
                 <a:spcPct val="100000"/>
               </a:lnSpc>
@@ -5218,7 +5218,7 @@
             </a:endParaRPr>
           </a:p>
           <a:p>
-            <a:pPr lvl="2" marL="1296000" indent="-286560">
+            <a:pPr lvl="2" marL="1296000" indent="-286200">
               <a:lnSpc>
                 <a:spcPct val="100000"/>
               </a:lnSpc>
@@ -5247,7 +5247,7 @@
             </a:endParaRPr>
           </a:p>
           <a:p>
-            <a:pPr marL="432000" indent="-322560">
+            <a:pPr marL="432000" indent="-322200">
               <a:lnSpc>
                 <a:spcPct val="100000"/>
               </a:lnSpc>
@@ -5276,7 +5276,7 @@
             </a:endParaRPr>
           </a:p>
           <a:p>
-            <a:pPr lvl="1" marL="864000" indent="-322560">
+            <a:pPr lvl="1" marL="864000" indent="-322200">
               <a:lnSpc>
                 <a:spcPct val="100000"/>
               </a:lnSpc>
@@ -5305,7 +5305,7 @@
             </a:endParaRPr>
           </a:p>
           <a:p>
-            <a:pPr lvl="1" marL="864000" indent="-322560">
+            <a:pPr lvl="1" marL="864000" indent="-322200">
               <a:lnSpc>
                 <a:spcPct val="100000"/>
               </a:lnSpc>
@@ -5334,19 +5334,13 @@
             </a:endParaRPr>
           </a:p>
           <a:p>
-            <a:pPr marL="432000" indent="-322560">
+            <a:pPr>
               <a:lnSpc>
                 <a:spcPct val="100000"/>
               </a:lnSpc>
               <a:spcBef>
                 <a:spcPts val="1414"/>
               </a:spcBef>
-              <a:buClr>
-                <a:srgbClr val="ffffff"/>
-              </a:buClr>
-              <a:buSzPct val="45000"/>
-              <a:buFont typeface="Wingdings" charset="2"/>
-              <a:buChar char=""/>
             </a:pPr>
             <a:endParaRPr b="0" lang="en-US" sz="2800" spc="-1" strike="noStrike">
               <a:latin typeface="Arial"/>
@@ -5400,7 +5394,7 @@
         <p:spPr>
           <a:xfrm>
             <a:off x="504000" y="226080"/>
-            <a:ext cx="9070200" cy="945000"/>
+            <a:ext cx="9069840" cy="944640"/>
           </a:xfrm>
           <a:prstGeom prst="rect">
             <a:avLst/>
@@ -5451,7 +5445,7 @@
         <p:spPr>
           <a:xfrm>
             <a:off x="504000" y="1326600"/>
-            <a:ext cx="9070200" cy="3286800"/>
+            <a:ext cx="9069840" cy="3286440"/>
           </a:xfrm>
           <a:prstGeom prst="rect">
             <a:avLst/>
@@ -5472,7 +5466,7 @@
             <a:normAutofit/>
           </a:bodyPr>
           <a:p>
-            <a:pPr marL="432000" indent="-322560">
+            <a:pPr marL="432000" indent="-322200">
               <a:lnSpc>
                 <a:spcPct val="100000"/>
               </a:lnSpc>
@@ -5501,7 +5495,7 @@
             </a:endParaRPr>
           </a:p>
           <a:p>
-            <a:pPr marL="432000" indent="-322560">
+            <a:pPr marL="432000" indent="-322200">
               <a:lnSpc>
                 <a:spcPct val="100000"/>
               </a:lnSpc>
@@ -5530,7 +5524,7 @@
             </a:endParaRPr>
           </a:p>
           <a:p>
-            <a:pPr marL="432000" indent="-322560">
+            <a:pPr marL="432000" indent="-322200">
               <a:lnSpc>
                 <a:spcPct val="100000"/>
               </a:lnSpc>
@@ -5559,7 +5553,7 @@
             </a:endParaRPr>
           </a:p>
           <a:p>
-            <a:pPr marL="432000" indent="-322560">
+            <a:pPr marL="432000" indent="-322200">
               <a:lnSpc>
                 <a:spcPct val="100000"/>
               </a:lnSpc>
@@ -5588,7 +5582,7 @@
             </a:endParaRPr>
           </a:p>
           <a:p>
-            <a:pPr lvl="1" marL="864000" indent="-322560">
+            <a:pPr lvl="1" marL="864000" indent="-322200">
               <a:lnSpc>
                 <a:spcPct val="100000"/>
               </a:lnSpc>
@@ -5677,7 +5671,7 @@
         <p:spPr>
           <a:xfrm>
             <a:off x="504000" y="226080"/>
-            <a:ext cx="9070200" cy="945000"/>
+            <a:ext cx="9069840" cy="944640"/>
           </a:xfrm>
           <a:prstGeom prst="rect">
             <a:avLst/>
@@ -5728,7 +5722,7 @@
         <p:spPr>
           <a:xfrm>
             <a:off x="504000" y="1326600"/>
-            <a:ext cx="9070200" cy="3286800"/>
+            <a:ext cx="9069840" cy="3286440"/>
           </a:xfrm>
           <a:prstGeom prst="rect">
             <a:avLst/>
@@ -5749,7 +5743,7 @@
             <a:normAutofit fontScale="76000"/>
           </a:bodyPr>
           <a:p>
-            <a:pPr marL="432000" indent="-322560">
+            <a:pPr marL="432000" indent="-322200">
               <a:lnSpc>
                 <a:spcPct val="100000"/>
               </a:lnSpc>
@@ -5778,7 +5772,7 @@
             </a:endParaRPr>
           </a:p>
           <a:p>
-            <a:pPr lvl="1" marL="864000" indent="-322560">
+            <a:pPr lvl="1" marL="864000" indent="-322200">
               <a:lnSpc>
                 <a:spcPct val="100000"/>
               </a:lnSpc>
@@ -5807,7 +5801,7 @@
             </a:endParaRPr>
           </a:p>
           <a:p>
-            <a:pPr lvl="1" marL="864000" indent="-322560">
+            <a:pPr lvl="1" marL="864000" indent="-322200">
               <a:lnSpc>
                 <a:spcPct val="100000"/>
               </a:lnSpc>
@@ -5836,7 +5830,7 @@
             </a:endParaRPr>
           </a:p>
           <a:p>
-            <a:pPr lvl="1" marL="864000" indent="-322560">
+            <a:pPr lvl="1" marL="864000" indent="-322200">
               <a:lnSpc>
                 <a:spcPct val="100000"/>
               </a:lnSpc>
@@ -5865,7 +5859,7 @@
             </a:endParaRPr>
           </a:p>
           <a:p>
-            <a:pPr lvl="2" marL="1296000" indent="-286560">
+            <a:pPr lvl="2" marL="1296000" indent="-286200">
               <a:lnSpc>
                 <a:spcPct val="100000"/>
               </a:lnSpc>
@@ -5894,7 +5888,7 @@
             </a:endParaRPr>
           </a:p>
           <a:p>
-            <a:pPr lvl="2" marL="1296000" indent="-286560">
+            <a:pPr lvl="2" marL="1296000" indent="-286200">
               <a:lnSpc>
                 <a:spcPct val="100000"/>
               </a:lnSpc>
@@ -5923,7 +5917,7 @@
             </a:endParaRPr>
           </a:p>
           <a:p>
-            <a:pPr lvl="1" marL="864000" indent="-322560">
+            <a:pPr lvl="1" marL="864000" indent="-322200">
               <a:lnSpc>
                 <a:spcPct val="100000"/>
               </a:lnSpc>
@@ -6012,7 +6006,7 @@
         <p:spPr>
           <a:xfrm>
             <a:off x="504000" y="226080"/>
-            <a:ext cx="9070200" cy="945000"/>
+            <a:ext cx="9069840" cy="944640"/>
           </a:xfrm>
           <a:prstGeom prst="rect">
             <a:avLst/>
@@ -6063,7 +6057,7 @@
         <p:spPr>
           <a:xfrm>
             <a:off x="504000" y="1326600"/>
-            <a:ext cx="9070200" cy="3286800"/>
+            <a:ext cx="9069840" cy="3286440"/>
           </a:xfrm>
           <a:prstGeom prst="rect">
             <a:avLst/>
@@ -6084,7 +6078,7 @@
             <a:normAutofit fontScale="65000"/>
           </a:bodyPr>
           <a:p>
-            <a:pPr marL="432000" indent="-322560">
+            <a:pPr marL="432000" indent="-322200">
               <a:lnSpc>
                 <a:spcPct val="100000"/>
               </a:lnSpc>
@@ -6113,7 +6107,7 @@
             </a:endParaRPr>
           </a:p>
           <a:p>
-            <a:pPr lvl="1" marL="864000" indent="-322560">
+            <a:pPr lvl="1" marL="864000" indent="-322200">
               <a:lnSpc>
                 <a:spcPct val="100000"/>
               </a:lnSpc>
@@ -6142,7 +6136,7 @@
             </a:endParaRPr>
           </a:p>
           <a:p>
-            <a:pPr lvl="1" marL="864000" indent="-322560">
+            <a:pPr lvl="1" marL="864000" indent="-322200">
               <a:lnSpc>
                 <a:spcPct val="100000"/>
               </a:lnSpc>
@@ -6171,7 +6165,7 @@
             </a:endParaRPr>
           </a:p>
           <a:p>
-            <a:pPr lvl="1" marL="864000" indent="-322560">
+            <a:pPr lvl="1" marL="864000" indent="-322200">
               <a:lnSpc>
                 <a:spcPct val="100000"/>
               </a:lnSpc>
@@ -6200,7 +6194,7 @@
             </a:endParaRPr>
           </a:p>
           <a:p>
-            <a:pPr lvl="2" marL="1296000" indent="-286560">
+            <a:pPr lvl="2" marL="1296000" indent="-286200">
               <a:lnSpc>
                 <a:spcPct val="100000"/>
               </a:lnSpc>
@@ -6229,7 +6223,7 @@
             </a:endParaRPr>
           </a:p>
           <a:p>
-            <a:pPr lvl="1" marL="864000" indent="-322560">
+            <a:pPr lvl="1" marL="864000" indent="-322200">
               <a:lnSpc>
                 <a:spcPct val="100000"/>
               </a:lnSpc>
@@ -6258,7 +6252,7 @@
             </a:endParaRPr>
           </a:p>
           <a:p>
-            <a:pPr lvl="1" marL="864000" indent="-322560">
+            <a:pPr lvl="1" marL="864000" indent="-322200">
               <a:lnSpc>
                 <a:spcPct val="100000"/>
               </a:lnSpc>
@@ -6334,7 +6328,7 @@
         <p:spPr>
           <a:xfrm>
             <a:off x="504000" y="226080"/>
-            <a:ext cx="9070200" cy="945000"/>
+            <a:ext cx="9069840" cy="944640"/>
           </a:xfrm>
           <a:prstGeom prst="rect">
             <a:avLst/>
@@ -6385,7 +6379,7 @@
         <p:spPr>
           <a:xfrm>
             <a:off x="504000" y="1326600"/>
-            <a:ext cx="9070200" cy="3286800"/>
+            <a:ext cx="9069840" cy="3286440"/>
           </a:xfrm>
           <a:prstGeom prst="rect">
             <a:avLst/>
@@ -6429,7 +6423,7 @@
             </a:endParaRPr>
           </a:p>
           <a:p>
-            <a:pPr marL="432000" indent="-322560">
+            <a:pPr marL="432000" indent="-322200">
               <a:lnSpc>
                 <a:spcPct val="100000"/>
               </a:lnSpc>
@@ -6458,7 +6452,7 @@
             </a:endParaRPr>
           </a:p>
           <a:p>
-            <a:pPr lvl="1" marL="864000" indent="-322560">
+            <a:pPr lvl="1" marL="864000" indent="-322200">
               <a:lnSpc>
                 <a:spcPct val="100000"/>
               </a:lnSpc>
@@ -6487,7 +6481,7 @@
             </a:endParaRPr>
           </a:p>
           <a:p>
-            <a:pPr marL="432000" indent="-322560">
+            <a:pPr marL="432000" indent="-322200">
               <a:lnSpc>
                 <a:spcPct val="100000"/>
               </a:lnSpc>
@@ -6516,7 +6510,7 @@
             </a:endParaRPr>
           </a:p>
           <a:p>
-            <a:pPr lvl="1" marL="864000" indent="-322560">
+            <a:pPr lvl="1" marL="864000" indent="-322200">
               <a:lnSpc>
                 <a:spcPct val="100000"/>
               </a:lnSpc>
@@ -6545,7 +6539,7 @@
             </a:endParaRPr>
           </a:p>
           <a:p>
-            <a:pPr lvl="1" marL="864000" indent="-322560">
+            <a:pPr lvl="1" marL="864000" indent="-322200">
               <a:lnSpc>
                 <a:spcPct val="100000"/>
               </a:lnSpc>
@@ -6584,7 +6578,7 @@
             </a:endParaRPr>
           </a:p>
           <a:p>
-            <a:pPr lvl="1" marL="864000" indent="-322560">
+            <a:pPr lvl="1" marL="864000" indent="-322200">
               <a:lnSpc>
                 <a:spcPct val="100000"/>
               </a:lnSpc>
@@ -6623,7 +6617,7 @@
             </a:endParaRPr>
           </a:p>
           <a:p>
-            <a:pPr lvl="1" marL="864000" indent="-322560">
+            <a:pPr lvl="1" marL="864000" indent="-322200">
               <a:lnSpc>
                 <a:spcPct val="100000"/>
               </a:lnSpc>
@@ -6662,7 +6656,7 @@
             </a:endParaRPr>
           </a:p>
           <a:p>
-            <a:pPr lvl="1" marL="864000" indent="-322560">
+            <a:pPr lvl="1" marL="864000" indent="-322200">
               <a:lnSpc>
                 <a:spcPct val="100000"/>
               </a:lnSpc>
@@ -6701,7 +6695,7 @@
             </a:endParaRPr>
           </a:p>
           <a:p>
-            <a:pPr lvl="1" marL="864000" indent="-322560">
+            <a:pPr lvl="1" marL="864000" indent="-322200">
               <a:lnSpc>
                 <a:spcPct val="100000"/>
               </a:lnSpc>
@@ -6740,7 +6734,7 @@
             </a:endParaRPr>
           </a:p>
           <a:p>
-            <a:pPr lvl="1" marL="864000" indent="-322560">
+            <a:pPr lvl="1" marL="864000" indent="-322200">
               <a:lnSpc>
                 <a:spcPct val="100000"/>
               </a:lnSpc>
@@ -6779,7 +6773,7 @@
             </a:endParaRPr>
           </a:p>
           <a:p>
-            <a:pPr lvl="1" marL="864000" indent="-322560">
+            <a:pPr lvl="1" marL="864000" indent="-322200">
               <a:lnSpc>
                 <a:spcPct val="100000"/>
               </a:lnSpc>
@@ -6818,7 +6812,7 @@
             </a:endParaRPr>
           </a:p>
           <a:p>
-            <a:pPr lvl="1" marL="864000" indent="-322560">
+            <a:pPr marL="432000" indent="-322200">
               <a:lnSpc>
                 <a:spcPct val="100000"/>
               </a:lnSpc>
@@ -6828,9 +6822,9 @@
               <a:buClr>
                 <a:srgbClr val="ffffff"/>
               </a:buClr>
-              <a:buSzPct val="75000"/>
-              <a:buFont typeface="Symbol"/>
-              <a:buChar char=""/>
+              <a:buSzPct val="45000"/>
+              <a:buFont typeface="Wingdings" charset="2"/>
+              <a:buChar char=""/>
             </a:pPr>
             <a:r>
               <a:rPr b="0" lang="en-US" sz="2800" spc="-1" strike="noStrike">
@@ -6840,7 +6834,7 @@
                 <a:latin typeface="Arial"/>
                 <a:ea typeface="DejaVu Sans"/>
               </a:rPr>
-              <a:t> </a:t>
+              <a:t>VSCode install C/C++ Clang Command Adapter</a:t>
             </a:r>
             <a:endParaRPr b="0" lang="en-US" sz="2800" spc="-1" strike="noStrike">
               <a:latin typeface="Arial"/>
@@ -6894,7 +6888,7 @@
         <p:spPr>
           <a:xfrm>
             <a:off x="504000" y="226080"/>
-            <a:ext cx="9070200" cy="945000"/>
+            <a:ext cx="9069840" cy="944640"/>
           </a:xfrm>
           <a:prstGeom prst="rect">
             <a:avLst/>
@@ -6945,7 +6939,7 @@
         <p:spPr>
           <a:xfrm>
             <a:off x="504000" y="1326600"/>
-            <a:ext cx="9070200" cy="3286800"/>
+            <a:ext cx="9069840" cy="3286440"/>
           </a:xfrm>
           <a:prstGeom prst="rect">
             <a:avLst/>
@@ -6966,7 +6960,7 @@
             <a:normAutofit fontScale="85000"/>
           </a:bodyPr>
           <a:p>
-            <a:pPr marL="432000" indent="-322560">
+            <a:pPr marL="432000" indent="-322200">
               <a:lnSpc>
                 <a:spcPct val="100000"/>
               </a:lnSpc>
@@ -6995,7 +6989,7 @@
             </a:endParaRPr>
           </a:p>
           <a:p>
-            <a:pPr marL="432000" indent="-322560">
+            <a:pPr marL="432000" indent="-322200">
               <a:lnSpc>
                 <a:spcPct val="100000"/>
               </a:lnSpc>
@@ -7024,7 +7018,7 @@
             </a:endParaRPr>
           </a:p>
           <a:p>
-            <a:pPr marL="432000" indent="-322560">
+            <a:pPr marL="432000" indent="-322200">
               <a:lnSpc>
                 <a:spcPct val="100000"/>
               </a:lnSpc>
@@ -7053,7 +7047,7 @@
             </a:endParaRPr>
           </a:p>
           <a:p>
-            <a:pPr marL="432000" indent="-322560">
+            <a:pPr marL="432000" indent="-322200">
               <a:lnSpc>
                 <a:spcPct val="100000"/>
               </a:lnSpc>
@@ -7082,7 +7076,7 @@
             </a:endParaRPr>
           </a:p>
           <a:p>
-            <a:pPr marL="432000" indent="-322560">
+            <a:pPr marL="432000" indent="-322200">
               <a:lnSpc>
                 <a:spcPct val="100000"/>
               </a:lnSpc>
@@ -7111,7 +7105,7 @@
             </a:endParaRPr>
           </a:p>
           <a:p>
-            <a:pPr lvl="1" marL="432000" indent="-214920">
+            <a:pPr lvl="1" marL="432000" indent="-214560">
               <a:lnSpc>
                 <a:spcPct val="100000"/>
               </a:lnSpc>

</xml_diff>

<commit_message>
add link to this
</commit_message>
<xml_diff>
--- a/FreeBSD-Drop/Desktop/FreeBSD.pptx
+++ b/FreeBSD-Drop/Desktop/FreeBSD.pptx
@@ -3275,7 +3275,7 @@
         <p:spPr>
           <a:xfrm>
             <a:off x="504000" y="226080"/>
-            <a:ext cx="9069840" cy="944640"/>
+            <a:ext cx="9069480" cy="944280"/>
           </a:xfrm>
           <a:prstGeom prst="rect">
             <a:avLst/>
@@ -3326,7 +3326,7 @@
         <p:spPr>
           <a:xfrm>
             <a:off x="504000" y="1326600"/>
-            <a:ext cx="9069840" cy="3286440"/>
+            <a:ext cx="9069480" cy="3286080"/>
           </a:xfrm>
           <a:prstGeom prst="rect">
             <a:avLst/>
@@ -3454,7 +3454,7 @@
         <p:spPr>
           <a:xfrm>
             <a:off x="504000" y="226080"/>
-            <a:ext cx="9069840" cy="944640"/>
+            <a:ext cx="9069480" cy="944280"/>
           </a:xfrm>
           <a:prstGeom prst="rect">
             <a:avLst/>
@@ -3505,7 +3505,7 @@
         <p:spPr>
           <a:xfrm>
             <a:off x="504000" y="1326600"/>
-            <a:ext cx="9069840" cy="3286440"/>
+            <a:ext cx="9069480" cy="3286080"/>
           </a:xfrm>
           <a:prstGeom prst="rect">
             <a:avLst/>
@@ -3526,7 +3526,7 @@
             <a:normAutofit fontScale="57000"/>
           </a:bodyPr>
           <a:p>
-            <a:pPr marL="432000" indent="-322200">
+            <a:pPr marL="432000" indent="-321840">
               <a:lnSpc>
                 <a:spcPct val="100000"/>
               </a:lnSpc>
@@ -3556,7 +3556,7 @@
             </a:endParaRPr>
           </a:p>
           <a:p>
-            <a:pPr marL="432000" indent="-322200">
+            <a:pPr marL="432000" indent="-321840">
               <a:lnSpc>
                 <a:spcPct val="100000"/>
               </a:lnSpc>
@@ -3598,7 +3598,7 @@
             </a:endParaRPr>
           </a:p>
           <a:p>
-            <a:pPr marL="432000" indent="-322200">
+            <a:pPr marL="432000" indent="-321840">
               <a:lnSpc>
                 <a:spcPct val="100000"/>
               </a:lnSpc>
@@ -3627,7 +3627,7 @@
             </a:endParaRPr>
           </a:p>
           <a:p>
-            <a:pPr marL="432000" indent="-322200">
+            <a:pPr marL="432000" indent="-321840">
               <a:lnSpc>
                 <a:spcPct val="100000"/>
               </a:lnSpc>
@@ -3656,7 +3656,7 @@
             </a:endParaRPr>
           </a:p>
           <a:p>
-            <a:pPr lvl="1" marL="864000" indent="-322200">
+            <a:pPr lvl="1" marL="864000" indent="-321840">
               <a:lnSpc>
                 <a:spcPct val="100000"/>
               </a:lnSpc>
@@ -3695,7 +3695,7 @@
             </a:endParaRPr>
           </a:p>
           <a:p>
-            <a:pPr marL="432000" indent="-322200">
+            <a:pPr marL="432000" indent="-321840">
               <a:lnSpc>
                 <a:spcPct val="100000"/>
               </a:lnSpc>
@@ -3724,7 +3724,7 @@
             </a:endParaRPr>
           </a:p>
           <a:p>
-            <a:pPr lvl="1" marL="864000" indent="-322200">
+            <a:pPr lvl="1" marL="864000" indent="-321840">
               <a:lnSpc>
                 <a:spcPct val="100000"/>
               </a:lnSpc>
@@ -3813,7 +3813,7 @@
         <p:spPr>
           <a:xfrm>
             <a:off x="504000" y="226080"/>
-            <a:ext cx="9069840" cy="944640"/>
+            <a:ext cx="9069480" cy="944280"/>
           </a:xfrm>
           <a:prstGeom prst="rect">
             <a:avLst/>
@@ -3874,7 +3874,7 @@
         <p:spPr>
           <a:xfrm>
             <a:off x="1600200" y="1143000"/>
-            <a:ext cx="7770960" cy="4113360"/>
+            <a:ext cx="7770600" cy="4113000"/>
           </a:xfrm>
           <a:prstGeom prst="rect">
             <a:avLst/>
@@ -4021,7 +4021,7 @@
         <p:spPr>
           <a:xfrm>
             <a:off x="504000" y="226080"/>
-            <a:ext cx="9069840" cy="944640"/>
+            <a:ext cx="9069480" cy="944280"/>
           </a:xfrm>
           <a:prstGeom prst="rect">
             <a:avLst/>
@@ -4072,7 +4072,7 @@
         <p:spPr>
           <a:xfrm>
             <a:off x="504000" y="1326600"/>
-            <a:ext cx="9069840" cy="3286440"/>
+            <a:ext cx="9069480" cy="3286080"/>
           </a:xfrm>
           <a:prstGeom prst="rect">
             <a:avLst/>
@@ -4090,10 +4090,10 @@
         </p:style>
         <p:txBody>
           <a:bodyPr lIns="0" rIns="0" tIns="0" bIns="0">
-            <a:normAutofit fontScale="70000"/>
-          </a:bodyPr>
-          <a:p>
-            <a:pPr marL="432000" indent="-322200">
+            <a:normAutofit/>
+          </a:bodyPr>
+          <a:p>
+            <a:pPr marL="432000" indent="-321840">
               <a:lnSpc>
                 <a:spcPct val="100000"/>
               </a:lnSpc>
@@ -4122,7 +4122,7 @@
             </a:endParaRPr>
           </a:p>
           <a:p>
-            <a:pPr marL="432000" indent="-322200">
+            <a:pPr marL="432000" indent="-321840">
               <a:lnSpc>
                 <a:spcPct val="100000"/>
               </a:lnSpc>
@@ -4151,19 +4151,13 @@
             </a:endParaRPr>
           </a:p>
           <a:p>
-            <a:pPr lvl="1" marL="864000" indent="-322200">
+            <a:pPr>
               <a:lnSpc>
                 <a:spcPct val="100000"/>
               </a:lnSpc>
               <a:spcBef>
                 <a:spcPts val="1134"/>
               </a:spcBef>
-              <a:buClr>
-                <a:srgbClr val="ffffff"/>
-              </a:buClr>
-              <a:buSzPct val="75000"/>
-              <a:buFont typeface="Symbol"/>
-              <a:buChar char=""/>
             </a:pPr>
             <a:r>
               <a:rPr b="0" lang="en-US" sz="2800" spc="-1" strike="noStrike">
@@ -4173,43 +4167,14 @@
                 <a:latin typeface="Arial"/>
                 <a:ea typeface="DejaVu Sans"/>
               </a:rPr>
-              <a:t>Give tour</a:t>
+              <a:t>https://github.com/stevemac321/snippets/blob/master/FreeBSD-Drop/Desktop/FreeBSD.pptx</a:t>
             </a:r>
             <a:endParaRPr b="0" lang="en-US" sz="2800" spc="-1" strike="noStrike">
               <a:latin typeface="Arial"/>
             </a:endParaRPr>
           </a:p>
           <a:p>
-            <a:pPr lvl="1" marL="864000" indent="-322200">
-              <a:lnSpc>
-                <a:spcPct val="100000"/>
-              </a:lnSpc>
-              <a:spcBef>
-                <a:spcPts val="1134"/>
-              </a:spcBef>
-              <a:buClr>
-                <a:srgbClr val="ffffff"/>
-              </a:buClr>
-              <a:buSzPct val="75000"/>
-              <a:buFont typeface="Symbol"/>
-              <a:buChar char=""/>
-            </a:pPr>
-            <a:r>
-              <a:rPr b="0" lang="en-US" sz="2800" spc="-1" strike="noStrike">
-                <a:solidFill>
-                  <a:srgbClr val="000000"/>
-                </a:solidFill>
-                <a:latin typeface="Arial"/>
-                <a:ea typeface="DejaVu Sans"/>
-              </a:rPr>
-              <a:t>Other videos, jails, ARM asm sort, microcontroller, google test</a:t>
-            </a:r>
-            <a:endParaRPr b="0" lang="en-US" sz="2800" spc="-1" strike="noStrike">
-              <a:latin typeface="Arial"/>
-            </a:endParaRPr>
-          </a:p>
-          <a:p>
-            <a:pPr marL="432000" indent="-322200">
+            <a:pPr marL="432000" indent="-321840">
               <a:lnSpc>
                 <a:spcPct val="100000"/>
               </a:lnSpc>
@@ -4231,38 +4196,9 @@
                 <a:latin typeface="Arial"/>
                 <a:ea typeface="DejaVu Sans"/>
               </a:rPr>
-              <a:t>Ssh and rsync without password:</a:t>
-            </a:r>
-            <a:endParaRPr b="0" lang="en-US" sz="3200" spc="-1" strike="noStrike">
-              <a:latin typeface="Arial"/>
-            </a:endParaRPr>
-          </a:p>
-          <a:p>
-            <a:pPr lvl="1" marL="864000" indent="-322200">
-              <a:lnSpc>
-                <a:spcPct val="100000"/>
-              </a:lnSpc>
-              <a:spcBef>
-                <a:spcPts val="1134"/>
-              </a:spcBef>
-              <a:buClr>
-                <a:srgbClr val="ffffff"/>
-              </a:buClr>
-              <a:buSzPct val="75000"/>
-              <a:buFont typeface="Symbol"/>
-              <a:buChar char=""/>
-            </a:pPr>
-            <a:r>
-              <a:rPr b="0" lang="en-US" sz="2800" spc="-1" strike="noStrike">
-                <a:solidFill>
-                  <a:srgbClr val="000000"/>
-                </a:solidFill>
-                <a:latin typeface="Arial"/>
-                <a:ea typeface="DejaVu Sans"/>
-              </a:rPr>
-              <a:t>https://lists.freebsd.org/pipermail/freebsd-questions/2003-March/000108.html</a:t>
-            </a:r>
-            <a:endParaRPr b="0" lang="en-US" sz="2800" spc="-1" strike="noStrike">
+              <a:t>Give tour of github</a:t>
+            </a:r>
+            <a:endParaRPr b="0" lang="en-US" sz="3200" spc="-1" strike="noStrike">
               <a:latin typeface="Arial"/>
             </a:endParaRPr>
           </a:p>
@@ -4314,7 +4250,7 @@
         <p:spPr>
           <a:xfrm>
             <a:off x="504000" y="226080"/>
-            <a:ext cx="9069840" cy="944640"/>
+            <a:ext cx="9069480" cy="944280"/>
           </a:xfrm>
           <a:prstGeom prst="rect">
             <a:avLst/>
@@ -4365,7 +4301,7 @@
         <p:spPr>
           <a:xfrm>
             <a:off x="504000" y="1326600"/>
-            <a:ext cx="9069840" cy="3286440"/>
+            <a:ext cx="9069480" cy="3286080"/>
           </a:xfrm>
           <a:prstGeom prst="rect">
             <a:avLst/>
@@ -4386,7 +4322,7 @@
             <a:normAutofit/>
           </a:bodyPr>
           <a:p>
-            <a:pPr marL="432000" indent="-322200">
+            <a:pPr marL="432000" indent="-321840">
               <a:lnSpc>
                 <a:spcPct val="100000"/>
               </a:lnSpc>
@@ -4415,7 +4351,7 @@
             </a:endParaRPr>
           </a:p>
           <a:p>
-            <a:pPr marL="432000" indent="-322200">
+            <a:pPr marL="432000" indent="-321840">
               <a:lnSpc>
                 <a:spcPct val="100000"/>
               </a:lnSpc>
@@ -4444,7 +4380,7 @@
             </a:endParaRPr>
           </a:p>
           <a:p>
-            <a:pPr marL="432000" indent="-322200">
+            <a:pPr marL="432000" indent="-321840">
               <a:lnSpc>
                 <a:spcPct val="100000"/>
               </a:lnSpc>
@@ -4473,7 +4409,7 @@
             </a:endParaRPr>
           </a:p>
           <a:p>
-            <a:pPr marL="432000" indent="-322200">
+            <a:pPr marL="432000" indent="-321840">
               <a:lnSpc>
                 <a:spcPct val="100000"/>
               </a:lnSpc>
@@ -4549,7 +4485,7 @@
         <p:spPr>
           <a:xfrm>
             <a:off x="504000" y="226080"/>
-            <a:ext cx="9069840" cy="944640"/>
+            <a:ext cx="9069480" cy="944280"/>
           </a:xfrm>
           <a:prstGeom prst="rect">
             <a:avLst/>
@@ -4600,7 +4536,7 @@
         <p:spPr>
           <a:xfrm>
             <a:off x="504000" y="1326600"/>
-            <a:ext cx="9069840" cy="3286440"/>
+            <a:ext cx="9069480" cy="3286080"/>
           </a:xfrm>
           <a:prstGeom prst="rect">
             <a:avLst/>
@@ -4621,7 +4557,7 @@
             <a:normAutofit fontScale="31000"/>
           </a:bodyPr>
           <a:p>
-            <a:pPr marL="432000" indent="-322200">
+            <a:pPr marL="432000" indent="-321840">
               <a:lnSpc>
                 <a:spcPct val="100000"/>
               </a:lnSpc>
@@ -4650,7 +4586,7 @@
             </a:endParaRPr>
           </a:p>
           <a:p>
-            <a:pPr marL="432000" indent="-322200">
+            <a:pPr marL="432000" indent="-321840">
               <a:lnSpc>
                 <a:spcPct val="100000"/>
               </a:lnSpc>
@@ -4679,7 +4615,7 @@
             </a:endParaRPr>
           </a:p>
           <a:p>
-            <a:pPr lvl="1" marL="864000" indent="-322200">
+            <a:pPr lvl="1" marL="864000" indent="-321840">
               <a:lnSpc>
                 <a:spcPct val="100000"/>
               </a:lnSpc>
@@ -4708,7 +4644,7 @@
             </a:endParaRPr>
           </a:p>
           <a:p>
-            <a:pPr lvl="1" marL="864000" indent="-322200">
+            <a:pPr lvl="1" marL="864000" indent="-321840">
               <a:lnSpc>
                 <a:spcPct val="100000"/>
               </a:lnSpc>
@@ -4767,7 +4703,7 @@
             </a:endParaRPr>
           </a:p>
           <a:p>
-            <a:pPr marL="432000" indent="-322200">
+            <a:pPr marL="432000" indent="-321840">
               <a:lnSpc>
                 <a:spcPct val="100000"/>
               </a:lnSpc>
@@ -4796,7 +4732,7 @@
             </a:endParaRPr>
           </a:p>
           <a:p>
-            <a:pPr lvl="1" marL="864000" indent="-322200">
+            <a:pPr lvl="1" marL="864000" indent="-321840">
               <a:lnSpc>
                 <a:spcPct val="100000"/>
               </a:lnSpc>
@@ -4825,7 +4761,7 @@
             </a:endParaRPr>
           </a:p>
           <a:p>
-            <a:pPr lvl="1" marL="864000" indent="-322200">
+            <a:pPr lvl="1" marL="864000" indent="-321840">
               <a:lnSpc>
                 <a:spcPct val="100000"/>
               </a:lnSpc>
@@ -4854,7 +4790,7 @@
             </a:endParaRPr>
           </a:p>
           <a:p>
-            <a:pPr lvl="1" marL="864000" indent="-322200">
+            <a:pPr lvl="1" marL="864000" indent="-321840">
               <a:lnSpc>
                 <a:spcPct val="100000"/>
               </a:lnSpc>
@@ -4883,7 +4819,7 @@
             </a:endParaRPr>
           </a:p>
           <a:p>
-            <a:pPr lvl="1" marL="864000" indent="-322200">
+            <a:pPr lvl="1" marL="864000" indent="-321840">
               <a:lnSpc>
                 <a:spcPct val="100000"/>
               </a:lnSpc>
@@ -4972,7 +4908,7 @@
         <p:spPr>
           <a:xfrm>
             <a:off x="504000" y="226080"/>
-            <a:ext cx="9069840" cy="944640"/>
+            <a:ext cx="9069480" cy="944280"/>
           </a:xfrm>
           <a:prstGeom prst="rect">
             <a:avLst/>
@@ -5023,7 +4959,7 @@
         <p:spPr>
           <a:xfrm>
             <a:off x="504000" y="1326600"/>
-            <a:ext cx="9069840" cy="3286440"/>
+            <a:ext cx="9069480" cy="3286080"/>
           </a:xfrm>
           <a:prstGeom prst="rect">
             <a:avLst/>
@@ -5044,7 +4980,7 @@
             <a:normAutofit fontScale="49000"/>
           </a:bodyPr>
           <a:p>
-            <a:pPr marL="432000" indent="-322200">
+            <a:pPr marL="432000" indent="-321840">
               <a:lnSpc>
                 <a:spcPct val="100000"/>
               </a:lnSpc>
@@ -5073,7 +5009,7 @@
             </a:endParaRPr>
           </a:p>
           <a:p>
-            <a:pPr lvl="1" marL="864000" indent="-322200">
+            <a:pPr lvl="1" marL="864000" indent="-321840">
               <a:lnSpc>
                 <a:spcPct val="100000"/>
               </a:lnSpc>
@@ -5102,7 +5038,7 @@
             </a:endParaRPr>
           </a:p>
           <a:p>
-            <a:pPr lvl="1" marL="864000" indent="-322200">
+            <a:pPr lvl="1" marL="864000" indent="-321840">
               <a:lnSpc>
                 <a:spcPct val="100000"/>
               </a:lnSpc>
@@ -5131,7 +5067,7 @@
             </a:endParaRPr>
           </a:p>
           <a:p>
-            <a:pPr lvl="1" marL="864000" indent="-322200">
+            <a:pPr lvl="1" marL="864000" indent="-321840">
               <a:lnSpc>
                 <a:spcPct val="100000"/>
               </a:lnSpc>
@@ -5160,7 +5096,7 @@
             </a:endParaRPr>
           </a:p>
           <a:p>
-            <a:pPr lvl="1" marL="864000" indent="-322200">
+            <a:pPr lvl="1" marL="864000" indent="-321840">
               <a:lnSpc>
                 <a:spcPct val="100000"/>
               </a:lnSpc>
@@ -5189,7 +5125,7 @@
             </a:endParaRPr>
           </a:p>
           <a:p>
-            <a:pPr lvl="2" marL="1296000" indent="-286200">
+            <a:pPr lvl="2" marL="1296000" indent="-285840">
               <a:lnSpc>
                 <a:spcPct val="100000"/>
               </a:lnSpc>
@@ -5218,7 +5154,7 @@
             </a:endParaRPr>
           </a:p>
           <a:p>
-            <a:pPr lvl="2" marL="1296000" indent="-286200">
+            <a:pPr lvl="2" marL="1296000" indent="-285840">
               <a:lnSpc>
                 <a:spcPct val="100000"/>
               </a:lnSpc>
@@ -5247,7 +5183,7 @@
             </a:endParaRPr>
           </a:p>
           <a:p>
-            <a:pPr marL="432000" indent="-322200">
+            <a:pPr marL="432000" indent="-321840">
               <a:lnSpc>
                 <a:spcPct val="100000"/>
               </a:lnSpc>
@@ -5276,7 +5212,7 @@
             </a:endParaRPr>
           </a:p>
           <a:p>
-            <a:pPr lvl="1" marL="864000" indent="-322200">
+            <a:pPr lvl="1" marL="864000" indent="-321840">
               <a:lnSpc>
                 <a:spcPct val="100000"/>
               </a:lnSpc>
@@ -5305,7 +5241,7 @@
             </a:endParaRPr>
           </a:p>
           <a:p>
-            <a:pPr lvl="1" marL="864000" indent="-322200">
+            <a:pPr lvl="1" marL="864000" indent="-321840">
               <a:lnSpc>
                 <a:spcPct val="100000"/>
               </a:lnSpc>
@@ -5394,7 +5330,7 @@
         <p:spPr>
           <a:xfrm>
             <a:off x="504000" y="226080"/>
-            <a:ext cx="9069840" cy="944640"/>
+            <a:ext cx="9069480" cy="944280"/>
           </a:xfrm>
           <a:prstGeom prst="rect">
             <a:avLst/>
@@ -5445,7 +5381,7 @@
         <p:spPr>
           <a:xfrm>
             <a:off x="504000" y="1326600"/>
-            <a:ext cx="9069840" cy="3286440"/>
+            <a:ext cx="9069480" cy="3286080"/>
           </a:xfrm>
           <a:prstGeom prst="rect">
             <a:avLst/>
@@ -5466,7 +5402,7 @@
             <a:normAutofit/>
           </a:bodyPr>
           <a:p>
-            <a:pPr marL="432000" indent="-322200">
+            <a:pPr marL="432000" indent="-321840">
               <a:lnSpc>
                 <a:spcPct val="100000"/>
               </a:lnSpc>
@@ -5495,7 +5431,7 @@
             </a:endParaRPr>
           </a:p>
           <a:p>
-            <a:pPr marL="432000" indent="-322200">
+            <a:pPr marL="432000" indent="-321840">
               <a:lnSpc>
                 <a:spcPct val="100000"/>
               </a:lnSpc>
@@ -5524,7 +5460,7 @@
             </a:endParaRPr>
           </a:p>
           <a:p>
-            <a:pPr marL="432000" indent="-322200">
+            <a:pPr marL="432000" indent="-321840">
               <a:lnSpc>
                 <a:spcPct val="100000"/>
               </a:lnSpc>
@@ -5553,7 +5489,7 @@
             </a:endParaRPr>
           </a:p>
           <a:p>
-            <a:pPr marL="432000" indent="-322200">
+            <a:pPr marL="432000" indent="-321840">
               <a:lnSpc>
                 <a:spcPct val="100000"/>
               </a:lnSpc>
@@ -5582,7 +5518,7 @@
             </a:endParaRPr>
           </a:p>
           <a:p>
-            <a:pPr lvl="1" marL="864000" indent="-322200">
+            <a:pPr lvl="1" marL="864000" indent="-321840">
               <a:lnSpc>
                 <a:spcPct val="100000"/>
               </a:lnSpc>
@@ -5671,7 +5607,7 @@
         <p:spPr>
           <a:xfrm>
             <a:off x="504000" y="226080"/>
-            <a:ext cx="9069840" cy="944640"/>
+            <a:ext cx="9069480" cy="944280"/>
           </a:xfrm>
           <a:prstGeom prst="rect">
             <a:avLst/>
@@ -5722,7 +5658,7 @@
         <p:spPr>
           <a:xfrm>
             <a:off x="504000" y="1326600"/>
-            <a:ext cx="9069840" cy="3286440"/>
+            <a:ext cx="9069480" cy="3286080"/>
           </a:xfrm>
           <a:prstGeom prst="rect">
             <a:avLst/>
@@ -5743,7 +5679,7 @@
             <a:normAutofit fontScale="76000"/>
           </a:bodyPr>
           <a:p>
-            <a:pPr marL="432000" indent="-322200">
+            <a:pPr marL="432000" indent="-321840">
               <a:lnSpc>
                 <a:spcPct val="100000"/>
               </a:lnSpc>
@@ -5772,7 +5708,7 @@
             </a:endParaRPr>
           </a:p>
           <a:p>
-            <a:pPr lvl="1" marL="864000" indent="-322200">
+            <a:pPr lvl="1" marL="864000" indent="-321840">
               <a:lnSpc>
                 <a:spcPct val="100000"/>
               </a:lnSpc>
@@ -5801,7 +5737,7 @@
             </a:endParaRPr>
           </a:p>
           <a:p>
-            <a:pPr lvl="1" marL="864000" indent="-322200">
+            <a:pPr lvl="1" marL="864000" indent="-321840">
               <a:lnSpc>
                 <a:spcPct val="100000"/>
               </a:lnSpc>
@@ -5830,7 +5766,7 @@
             </a:endParaRPr>
           </a:p>
           <a:p>
-            <a:pPr lvl="1" marL="864000" indent="-322200">
+            <a:pPr lvl="1" marL="864000" indent="-321840">
               <a:lnSpc>
                 <a:spcPct val="100000"/>
               </a:lnSpc>
@@ -5859,7 +5795,7 @@
             </a:endParaRPr>
           </a:p>
           <a:p>
-            <a:pPr lvl="2" marL="1296000" indent="-286200">
+            <a:pPr lvl="2" marL="1296000" indent="-285840">
               <a:lnSpc>
                 <a:spcPct val="100000"/>
               </a:lnSpc>
@@ -5888,7 +5824,7 @@
             </a:endParaRPr>
           </a:p>
           <a:p>
-            <a:pPr lvl="2" marL="1296000" indent="-286200">
+            <a:pPr lvl="2" marL="1296000" indent="-285840">
               <a:lnSpc>
                 <a:spcPct val="100000"/>
               </a:lnSpc>
@@ -5917,7 +5853,7 @@
             </a:endParaRPr>
           </a:p>
           <a:p>
-            <a:pPr lvl="1" marL="864000" indent="-322200">
+            <a:pPr lvl="1" marL="864000" indent="-321840">
               <a:lnSpc>
                 <a:spcPct val="100000"/>
               </a:lnSpc>
@@ -6006,7 +5942,7 @@
         <p:spPr>
           <a:xfrm>
             <a:off x="504000" y="226080"/>
-            <a:ext cx="9069840" cy="944640"/>
+            <a:ext cx="9069480" cy="944280"/>
           </a:xfrm>
           <a:prstGeom prst="rect">
             <a:avLst/>
@@ -6057,7 +5993,7 @@
         <p:spPr>
           <a:xfrm>
             <a:off x="504000" y="1326600"/>
-            <a:ext cx="9069840" cy="3286440"/>
+            <a:ext cx="9069480" cy="3286080"/>
           </a:xfrm>
           <a:prstGeom prst="rect">
             <a:avLst/>
@@ -6078,7 +6014,7 @@
             <a:normAutofit fontScale="65000"/>
           </a:bodyPr>
           <a:p>
-            <a:pPr marL="432000" indent="-322200">
+            <a:pPr marL="432000" indent="-321840">
               <a:lnSpc>
                 <a:spcPct val="100000"/>
               </a:lnSpc>
@@ -6107,7 +6043,7 @@
             </a:endParaRPr>
           </a:p>
           <a:p>
-            <a:pPr lvl="1" marL="864000" indent="-322200">
+            <a:pPr lvl="1" marL="864000" indent="-321840">
               <a:lnSpc>
                 <a:spcPct val="100000"/>
               </a:lnSpc>
@@ -6136,7 +6072,7 @@
             </a:endParaRPr>
           </a:p>
           <a:p>
-            <a:pPr lvl="1" marL="864000" indent="-322200">
+            <a:pPr lvl="1" marL="864000" indent="-321840">
               <a:lnSpc>
                 <a:spcPct val="100000"/>
               </a:lnSpc>
@@ -6165,7 +6101,7 @@
             </a:endParaRPr>
           </a:p>
           <a:p>
-            <a:pPr lvl="1" marL="864000" indent="-322200">
+            <a:pPr lvl="1" marL="864000" indent="-321840">
               <a:lnSpc>
                 <a:spcPct val="100000"/>
               </a:lnSpc>
@@ -6194,7 +6130,7 @@
             </a:endParaRPr>
           </a:p>
           <a:p>
-            <a:pPr lvl="2" marL="1296000" indent="-286200">
+            <a:pPr lvl="2" marL="1296000" indent="-285840">
               <a:lnSpc>
                 <a:spcPct val="100000"/>
               </a:lnSpc>
@@ -6223,7 +6159,7 @@
             </a:endParaRPr>
           </a:p>
           <a:p>
-            <a:pPr lvl="1" marL="864000" indent="-322200">
+            <a:pPr lvl="1" marL="864000" indent="-321840">
               <a:lnSpc>
                 <a:spcPct val="100000"/>
               </a:lnSpc>
@@ -6252,7 +6188,7 @@
             </a:endParaRPr>
           </a:p>
           <a:p>
-            <a:pPr lvl="1" marL="864000" indent="-322200">
+            <a:pPr lvl="1" marL="864000" indent="-321840">
               <a:lnSpc>
                 <a:spcPct val="100000"/>
               </a:lnSpc>
@@ -6328,7 +6264,7 @@
         <p:spPr>
           <a:xfrm>
             <a:off x="504000" y="226080"/>
-            <a:ext cx="9069840" cy="944640"/>
+            <a:ext cx="9069480" cy="944280"/>
           </a:xfrm>
           <a:prstGeom prst="rect">
             <a:avLst/>
@@ -6379,7 +6315,7 @@
         <p:spPr>
           <a:xfrm>
             <a:off x="504000" y="1326600"/>
-            <a:ext cx="9069840" cy="3286440"/>
+            <a:ext cx="9069480" cy="3286080"/>
           </a:xfrm>
           <a:prstGeom prst="rect">
             <a:avLst/>
@@ -6423,7 +6359,7 @@
             </a:endParaRPr>
           </a:p>
           <a:p>
-            <a:pPr marL="432000" indent="-322200">
+            <a:pPr marL="432000" indent="-321840">
               <a:lnSpc>
                 <a:spcPct val="100000"/>
               </a:lnSpc>
@@ -6452,7 +6388,7 @@
             </a:endParaRPr>
           </a:p>
           <a:p>
-            <a:pPr lvl="1" marL="864000" indent="-322200">
+            <a:pPr lvl="1" marL="864000" indent="-321840">
               <a:lnSpc>
                 <a:spcPct val="100000"/>
               </a:lnSpc>
@@ -6481,7 +6417,7 @@
             </a:endParaRPr>
           </a:p>
           <a:p>
-            <a:pPr marL="432000" indent="-322200">
+            <a:pPr marL="432000" indent="-321840">
               <a:lnSpc>
                 <a:spcPct val="100000"/>
               </a:lnSpc>
@@ -6510,7 +6446,7 @@
             </a:endParaRPr>
           </a:p>
           <a:p>
-            <a:pPr lvl="1" marL="864000" indent="-322200">
+            <a:pPr lvl="1" marL="864000" indent="-321840">
               <a:lnSpc>
                 <a:spcPct val="100000"/>
               </a:lnSpc>
@@ -6539,7 +6475,7 @@
             </a:endParaRPr>
           </a:p>
           <a:p>
-            <a:pPr lvl="1" marL="864000" indent="-322200">
+            <a:pPr lvl="1" marL="864000" indent="-321840">
               <a:lnSpc>
                 <a:spcPct val="100000"/>
               </a:lnSpc>
@@ -6578,7 +6514,7 @@
             </a:endParaRPr>
           </a:p>
           <a:p>
-            <a:pPr lvl="1" marL="864000" indent="-322200">
+            <a:pPr lvl="1" marL="864000" indent="-321840">
               <a:lnSpc>
                 <a:spcPct val="100000"/>
               </a:lnSpc>
@@ -6617,7 +6553,7 @@
             </a:endParaRPr>
           </a:p>
           <a:p>
-            <a:pPr lvl="1" marL="864000" indent="-322200">
+            <a:pPr lvl="1" marL="864000" indent="-321840">
               <a:lnSpc>
                 <a:spcPct val="100000"/>
               </a:lnSpc>
@@ -6656,7 +6592,7 @@
             </a:endParaRPr>
           </a:p>
           <a:p>
-            <a:pPr lvl="1" marL="864000" indent="-322200">
+            <a:pPr lvl="1" marL="864000" indent="-321840">
               <a:lnSpc>
                 <a:spcPct val="100000"/>
               </a:lnSpc>
@@ -6695,7 +6631,7 @@
             </a:endParaRPr>
           </a:p>
           <a:p>
-            <a:pPr lvl="1" marL="864000" indent="-322200">
+            <a:pPr lvl="1" marL="864000" indent="-321840">
               <a:lnSpc>
                 <a:spcPct val="100000"/>
               </a:lnSpc>
@@ -6734,7 +6670,7 @@
             </a:endParaRPr>
           </a:p>
           <a:p>
-            <a:pPr lvl="1" marL="864000" indent="-322200">
+            <a:pPr lvl="1" marL="864000" indent="-321840">
               <a:lnSpc>
                 <a:spcPct val="100000"/>
               </a:lnSpc>
@@ -6773,7 +6709,7 @@
             </a:endParaRPr>
           </a:p>
           <a:p>
-            <a:pPr lvl="1" marL="864000" indent="-322200">
+            <a:pPr lvl="1" marL="864000" indent="-321840">
               <a:lnSpc>
                 <a:spcPct val="100000"/>
               </a:lnSpc>
@@ -6812,7 +6748,7 @@
             </a:endParaRPr>
           </a:p>
           <a:p>
-            <a:pPr marL="432000" indent="-322200">
+            <a:pPr marL="432000" indent="-321840">
               <a:lnSpc>
                 <a:spcPct val="100000"/>
               </a:lnSpc>
@@ -6888,7 +6824,7 @@
         <p:spPr>
           <a:xfrm>
             <a:off x="504000" y="226080"/>
-            <a:ext cx="9069840" cy="944640"/>
+            <a:ext cx="9069480" cy="944280"/>
           </a:xfrm>
           <a:prstGeom prst="rect">
             <a:avLst/>
@@ -6939,7 +6875,7 @@
         <p:spPr>
           <a:xfrm>
             <a:off x="504000" y="1326600"/>
-            <a:ext cx="9069840" cy="3286440"/>
+            <a:ext cx="9069480" cy="3286080"/>
           </a:xfrm>
           <a:prstGeom prst="rect">
             <a:avLst/>
@@ -6960,7 +6896,7 @@
             <a:normAutofit fontScale="85000"/>
           </a:bodyPr>
           <a:p>
-            <a:pPr marL="432000" indent="-322200">
+            <a:pPr marL="432000" indent="-321840">
               <a:lnSpc>
                 <a:spcPct val="100000"/>
               </a:lnSpc>
@@ -6989,7 +6925,7 @@
             </a:endParaRPr>
           </a:p>
           <a:p>
-            <a:pPr marL="432000" indent="-322200">
+            <a:pPr marL="432000" indent="-321840">
               <a:lnSpc>
                 <a:spcPct val="100000"/>
               </a:lnSpc>
@@ -7018,7 +6954,7 @@
             </a:endParaRPr>
           </a:p>
           <a:p>
-            <a:pPr marL="432000" indent="-322200">
+            <a:pPr marL="432000" indent="-321840">
               <a:lnSpc>
                 <a:spcPct val="100000"/>
               </a:lnSpc>
@@ -7047,7 +6983,7 @@
             </a:endParaRPr>
           </a:p>
           <a:p>
-            <a:pPr marL="432000" indent="-322200">
+            <a:pPr marL="432000" indent="-321840">
               <a:lnSpc>
                 <a:spcPct val="100000"/>
               </a:lnSpc>
@@ -7076,7 +7012,7 @@
             </a:endParaRPr>
           </a:p>
           <a:p>
-            <a:pPr marL="432000" indent="-322200">
+            <a:pPr marL="432000" indent="-321840">
               <a:lnSpc>
                 <a:spcPct val="100000"/>
               </a:lnSpc>
@@ -7105,7 +7041,7 @@
             </a:endParaRPr>
           </a:p>
           <a:p>
-            <a:pPr lvl="1" marL="432000" indent="-214560">
+            <a:pPr lvl="1" marL="432000" indent="-214200">
               <a:lnSpc>
                 <a:spcPct val="100000"/>
               </a:lnSpc>

</xml_diff>